<commit_message>
last minute changes to FCDIP talk
</commit_message>
<xml_diff>
--- a/Functors, Comonads, and Digital Image Processing/FCDIP-LambdaConf16.pptx
+++ b/Functors, Comonads, and Digital Image Processing/FCDIP-LambdaConf16.pptx
@@ -5,10 +5,10 @@
     <p:sldMasterId id="2147483648" r:id="rId2"/>
   </p:sldMasterIdLst>
   <p:notesMasterIdLst>
-    <p:notesMasterId r:id="rId32"/>
+    <p:notesMasterId r:id="rId33"/>
   </p:notesMasterIdLst>
   <p:handoutMasterIdLst>
-    <p:handoutMasterId r:id="rId33"/>
+    <p:handoutMasterId r:id="rId34"/>
   </p:handoutMasterIdLst>
   <p:sldIdLst>
     <p:sldId id="261" r:id="rId3"/>
@@ -40,6 +40,7 @@
     <p:sldId id="284" r:id="rId29"/>
     <p:sldId id="288" r:id="rId30"/>
     <p:sldId id="287" r:id="rId31"/>
+    <p:sldId id="291" r:id="rId32"/>
   </p:sldIdLst>
   <p:sldSz cx="12192000" cy="6858000"/>
   <p:notesSz cx="6858000" cy="9144000"/>
@@ -721,13 +722,12 @@
           <a:p>
             <a:r>
               <a:rPr lang="en-US" dirty="0" smtClean="0"/>
-              <a:t>Consumer-facing filters,</a:t>
+              <a:t>What</a:t>
             </a:r>
             <a:r>
               <a:rPr lang="en-US" baseline="0" dirty="0" smtClean="0"/>
-              <a:t> but we know real filters are compositions of smaller filters</a:t>
-            </a:r>
-            <a:endParaRPr lang="en-US" dirty="0"/>
+              <a:t> insights????  Ways we think about image processing???</a:t>
+            </a:r>
           </a:p>
         </p:txBody>
       </p:sp>
@@ -748,7 +748,7 @@
           <a:p>
             <a:fld id="{82869989-EB00-4EE7-BCB5-25BDC5BB29F8}" type="slidenum">
               <a:rPr lang="en-US" smtClean="0"/>
-              <a:t>2</a:t>
+              <a:t>1</a:t>
             </a:fld>
             <a:endParaRPr lang="en-US"/>
           </a:p>
@@ -757,7 +757,7 @@
     </p:spTree>
     <p:extLst>
       <p:ext uri="{BB962C8B-B14F-4D97-AF65-F5344CB8AC3E}">
-        <p14:creationId xmlns:p14="http://schemas.microsoft.com/office/powerpoint/2010/main" val="427482772"/>
+        <p14:creationId xmlns:p14="http://schemas.microsoft.com/office/powerpoint/2010/main" val="3551497034"/>
       </p:ext>
     </p:extLst>
   </p:cSld>
@@ -768,6 +768,178 @@
 </file>
 
 <file path=ppt/notesSlides/notesSlide10.xml><?xml version="1.0" encoding="utf-8"?>
+<p:notes xmlns:a="http://schemas.openxmlformats.org/drawingml/2006/main" xmlns:r="http://schemas.openxmlformats.org/officeDocument/2006/relationships" xmlns:p="http://schemas.openxmlformats.org/presentationml/2006/main">
+  <p:cSld>
+    <p:spTree>
+      <p:nvGrpSpPr>
+        <p:cNvPr id="1" name=""/>
+        <p:cNvGrpSpPr/>
+        <p:nvPr/>
+      </p:nvGrpSpPr>
+      <p:grpSpPr>
+        <a:xfrm>
+          <a:off x="0" y="0"/>
+          <a:ext cx="0" cy="0"/>
+          <a:chOff x="0" y="0"/>
+          <a:chExt cx="0" cy="0"/>
+        </a:xfrm>
+      </p:grpSpPr>
+      <p:sp>
+        <p:nvSpPr>
+          <p:cNvPr id="2" name="Slide Image Placeholder 1"/>
+          <p:cNvSpPr>
+            <a:spLocks noGrp="1" noRot="1" noChangeAspect="1"/>
+          </p:cNvSpPr>
+          <p:nvPr>
+            <p:ph type="sldImg"/>
+          </p:nvPr>
+        </p:nvSpPr>
+        <p:spPr/>
+      </p:sp>
+      <p:sp>
+        <p:nvSpPr>
+          <p:cNvPr id="3" name="Notes Placeholder 2"/>
+          <p:cNvSpPr>
+            <a:spLocks noGrp="1"/>
+          </p:cNvSpPr>
+          <p:nvPr>
+            <p:ph type="body" idx="1"/>
+          </p:nvPr>
+        </p:nvSpPr>
+        <p:spPr/>
+        <p:txBody>
+          <a:bodyPr/>
+          <a:lstStyle/>
+          <a:p>
+            <a:r>
+              <a:rPr lang="en-US" dirty="0" smtClean="0"/>
+              <a:t>They’re local filters!</a:t>
+            </a:r>
+            <a:endParaRPr lang="en-US" dirty="0"/>
+          </a:p>
+        </p:txBody>
+      </p:sp>
+      <p:sp>
+        <p:nvSpPr>
+          <p:cNvPr id="4" name="Slide Number Placeholder 3"/>
+          <p:cNvSpPr>
+            <a:spLocks noGrp="1"/>
+          </p:cNvSpPr>
+          <p:nvPr>
+            <p:ph type="sldNum" sz="quarter" idx="10"/>
+          </p:nvPr>
+        </p:nvSpPr>
+        <p:spPr/>
+        <p:txBody>
+          <a:bodyPr/>
+          <a:lstStyle/>
+          <a:p>
+            <a:fld id="{82869989-EB00-4EE7-BCB5-25BDC5BB29F8}" type="slidenum">
+              <a:rPr lang="en-US" smtClean="0"/>
+              <a:t>25</a:t>
+            </a:fld>
+            <a:endParaRPr lang="en-US"/>
+          </a:p>
+        </p:txBody>
+      </p:sp>
+    </p:spTree>
+    <p:extLst>
+      <p:ext uri="{BB962C8B-B14F-4D97-AF65-F5344CB8AC3E}">
+        <p14:creationId xmlns:p14="http://schemas.microsoft.com/office/powerpoint/2010/main" val="3982211142"/>
+      </p:ext>
+    </p:extLst>
+  </p:cSld>
+  <p:clrMapOvr>
+    <a:masterClrMapping/>
+  </p:clrMapOvr>
+</p:notes>
+</file>
+
+<file path=ppt/notesSlides/notesSlide11.xml><?xml version="1.0" encoding="utf-8"?>
+<p:notes xmlns:a="http://schemas.openxmlformats.org/drawingml/2006/main" xmlns:r="http://schemas.openxmlformats.org/officeDocument/2006/relationships" xmlns:p="http://schemas.openxmlformats.org/presentationml/2006/main">
+  <p:cSld>
+    <p:spTree>
+      <p:nvGrpSpPr>
+        <p:cNvPr id="1" name=""/>
+        <p:cNvGrpSpPr/>
+        <p:nvPr/>
+      </p:nvGrpSpPr>
+      <p:grpSpPr>
+        <a:xfrm>
+          <a:off x="0" y="0"/>
+          <a:ext cx="0" cy="0"/>
+          <a:chOff x="0" y="0"/>
+          <a:chExt cx="0" cy="0"/>
+        </a:xfrm>
+      </p:grpSpPr>
+      <p:sp>
+        <p:nvSpPr>
+          <p:cNvPr id="2" name="Slide Image Placeholder 1"/>
+          <p:cNvSpPr>
+            <a:spLocks noGrp="1" noRot="1" noChangeAspect="1"/>
+          </p:cNvSpPr>
+          <p:nvPr>
+            <p:ph type="sldImg"/>
+          </p:nvPr>
+        </p:nvSpPr>
+        <p:spPr/>
+      </p:sp>
+      <p:sp>
+        <p:nvSpPr>
+          <p:cNvPr id="3" name="Notes Placeholder 2"/>
+          <p:cNvSpPr>
+            <a:spLocks noGrp="1"/>
+          </p:cNvSpPr>
+          <p:nvPr>
+            <p:ph type="body" idx="1"/>
+          </p:nvPr>
+        </p:nvSpPr>
+        <p:spPr/>
+        <p:txBody>
+          <a:bodyPr/>
+          <a:lstStyle/>
+          <a:p>
+            <a:endParaRPr lang="en-US" dirty="0"/>
+          </a:p>
+        </p:txBody>
+      </p:sp>
+      <p:sp>
+        <p:nvSpPr>
+          <p:cNvPr id="4" name="Slide Number Placeholder 3"/>
+          <p:cNvSpPr>
+            <a:spLocks noGrp="1"/>
+          </p:cNvSpPr>
+          <p:nvPr>
+            <p:ph type="sldNum" sz="quarter" idx="10"/>
+          </p:nvPr>
+        </p:nvSpPr>
+        <p:spPr/>
+        <p:txBody>
+          <a:bodyPr/>
+          <a:lstStyle/>
+          <a:p>
+            <a:fld id="{82869989-EB00-4EE7-BCB5-25BDC5BB29F8}" type="slidenum">
+              <a:rPr lang="en-US" smtClean="0"/>
+              <a:t>26</a:t>
+            </a:fld>
+            <a:endParaRPr lang="en-US"/>
+          </a:p>
+        </p:txBody>
+      </p:sp>
+    </p:spTree>
+    <p:extLst>
+      <p:ext uri="{BB962C8B-B14F-4D97-AF65-F5344CB8AC3E}">
+        <p14:creationId xmlns:p14="http://schemas.microsoft.com/office/powerpoint/2010/main" val="755913098"/>
+      </p:ext>
+    </p:extLst>
+  </p:cSld>
+  <p:clrMapOvr>
+    <a:masterClrMapping/>
+  </p:clrMapOvr>
+</p:notes>
+</file>
+
+<file path=ppt/notesSlides/notesSlide12.xml><?xml version="1.0" encoding="utf-8"?>
 <p:notes xmlns:a="http://schemas.openxmlformats.org/drawingml/2006/main" xmlns:r="http://schemas.openxmlformats.org/officeDocument/2006/relationships" xmlns:p="http://schemas.openxmlformats.org/presentationml/2006/main">
   <p:cSld>
     <p:spTree>
@@ -899,6 +1071,14 @@
           <a:bodyPr/>
           <a:lstStyle/>
           <a:p>
+            <a:r>
+              <a:rPr lang="en-US" dirty="0" smtClean="0"/>
+              <a:t>Consumer-facing filters,</a:t>
+            </a:r>
+            <a:r>
+              <a:rPr lang="en-US" baseline="0" dirty="0" smtClean="0"/>
+              <a:t> but we know real filters are compositions of smaller filters</a:t>
+            </a:r>
             <a:endParaRPr lang="en-US" dirty="0"/>
           </a:p>
         </p:txBody>
@@ -920,7 +1100,7 @@
           <a:p>
             <a:fld id="{82869989-EB00-4EE7-BCB5-25BDC5BB29F8}" type="slidenum">
               <a:rPr lang="en-US" smtClean="0"/>
-              <a:t>3</a:t>
+              <a:t>2</a:t>
             </a:fld>
             <a:endParaRPr lang="en-US"/>
           </a:p>
@@ -929,7 +1109,7 @@
     </p:spTree>
     <p:extLst>
       <p:ext uri="{BB962C8B-B14F-4D97-AF65-F5344CB8AC3E}">
-        <p14:creationId xmlns:p14="http://schemas.microsoft.com/office/powerpoint/2010/main" val="3283646279"/>
+        <p14:creationId xmlns:p14="http://schemas.microsoft.com/office/powerpoint/2010/main" val="427482772"/>
       </p:ext>
     </p:extLst>
   </p:cSld>
@@ -983,18 +1163,6 @@
           <a:bodyPr/>
           <a:lstStyle/>
           <a:p>
-            <a:r>
-              <a:rPr lang="en-US" dirty="0" smtClean="0"/>
-              <a:t>One of</a:t>
-            </a:r>
-            <a:r>
-              <a:rPr lang="en-US" baseline="0" dirty="0" smtClean="0"/>
-              <a:t> the most influential articles I’ve read!  </a:t>
-            </a:r>
-            <a:r>
-              <a:rPr lang="en-US" dirty="0" smtClean="0"/>
-              <a:t>FDD is my name, not Gabriel’s</a:t>
-            </a:r>
             <a:endParaRPr lang="en-US" dirty="0"/>
           </a:p>
         </p:txBody>
@@ -1016,7 +1184,7 @@
           <a:p>
             <a:fld id="{82869989-EB00-4EE7-BCB5-25BDC5BB29F8}" type="slidenum">
               <a:rPr lang="en-US" smtClean="0"/>
-              <a:t>8</a:t>
+              <a:t>3</a:t>
             </a:fld>
             <a:endParaRPr lang="en-US"/>
           </a:p>
@@ -1025,7 +1193,7 @@
     </p:spTree>
     <p:extLst>
       <p:ext uri="{BB962C8B-B14F-4D97-AF65-F5344CB8AC3E}">
-        <p14:creationId xmlns:p14="http://schemas.microsoft.com/office/powerpoint/2010/main" val="3499069951"/>
+        <p14:creationId xmlns:p14="http://schemas.microsoft.com/office/powerpoint/2010/main" val="3283646279"/>
       </p:ext>
     </p:extLst>
   </p:cSld>
@@ -1081,7 +1249,15 @@
           <a:p>
             <a:r>
               <a:rPr lang="en-US" dirty="0" smtClean="0"/>
-              <a:t>We’ve created …</a:t>
+              <a:t>One of</a:t>
+            </a:r>
+            <a:r>
+              <a:rPr lang="en-US" baseline="0" dirty="0" smtClean="0"/>
+              <a:t> the most influential articles I’ve read!  </a:t>
+            </a:r>
+            <a:r>
+              <a:rPr lang="en-US" dirty="0" smtClean="0"/>
+              <a:t>FDD is my name, not Gabriel’s</a:t>
             </a:r>
             <a:endParaRPr lang="en-US" dirty="0"/>
           </a:p>
@@ -1104,7 +1280,7 @@
           <a:p>
             <a:fld id="{82869989-EB00-4EE7-BCB5-25BDC5BB29F8}" type="slidenum">
               <a:rPr lang="en-US" smtClean="0"/>
-              <a:t>15</a:t>
+              <a:t>8</a:t>
             </a:fld>
             <a:endParaRPr lang="en-US"/>
           </a:p>
@@ -1113,7 +1289,7 @@
     </p:spTree>
     <p:extLst>
       <p:ext uri="{BB962C8B-B14F-4D97-AF65-F5344CB8AC3E}">
-        <p14:creationId xmlns:p14="http://schemas.microsoft.com/office/powerpoint/2010/main" val="2781056756"/>
+        <p14:creationId xmlns:p14="http://schemas.microsoft.com/office/powerpoint/2010/main" val="3499069951"/>
       </p:ext>
     </p:extLst>
   </p:cSld>
@@ -1169,7 +1345,7 @@
           <a:p>
             <a:r>
               <a:rPr lang="en-US" dirty="0" smtClean="0"/>
-              <a:t>Anti Monads!  Just kidding.</a:t>
+              <a:t>We’ve created …</a:t>
             </a:r>
             <a:endParaRPr lang="en-US" dirty="0"/>
           </a:p>
@@ -1192,7 +1368,7 @@
           <a:p>
             <a:fld id="{82869989-EB00-4EE7-BCB5-25BDC5BB29F8}" type="slidenum">
               <a:rPr lang="en-US" smtClean="0"/>
-              <a:t>16</a:t>
+              <a:t>15</a:t>
             </a:fld>
             <a:endParaRPr lang="en-US"/>
           </a:p>
@@ -1201,7 +1377,7 @@
     </p:spTree>
     <p:extLst>
       <p:ext uri="{BB962C8B-B14F-4D97-AF65-F5344CB8AC3E}">
-        <p14:creationId xmlns:p14="http://schemas.microsoft.com/office/powerpoint/2010/main" val="974508889"/>
+        <p14:creationId xmlns:p14="http://schemas.microsoft.com/office/powerpoint/2010/main" val="2781056756"/>
       </p:ext>
     </p:extLst>
   </p:cSld>
@@ -1257,27 +1433,7 @@
           <a:p>
             <a:r>
               <a:rPr lang="en-US" dirty="0" smtClean="0"/>
-              <a:t>We</a:t>
-            </a:r>
-            <a:r>
-              <a:rPr lang="en-US" baseline="0" dirty="0" smtClean="0"/>
-              <a:t> often don’t use the </a:t>
-            </a:r>
-            <a:r>
-              <a:rPr lang="en-US" baseline="0" dirty="0" err="1" smtClean="0"/>
-              <a:t>Comonad</a:t>
-            </a:r>
-            <a:r>
-              <a:rPr lang="en-US" baseline="0" dirty="0" smtClean="0"/>
-              <a:t> </a:t>
-            </a:r>
-            <a:r>
-              <a:rPr lang="en-US" baseline="0" dirty="0" err="1" smtClean="0"/>
-              <a:t>typeclass</a:t>
-            </a:r>
-            <a:r>
-              <a:rPr lang="en-US" baseline="0" dirty="0" smtClean="0"/>
-              <a:t>, and instead use specific concrete functions and utilize the math for reassurances</a:t>
+              <a:t>Anti Monads!  Just kidding.</a:t>
             </a:r>
             <a:endParaRPr lang="en-US" dirty="0"/>
           </a:p>
@@ -1300,7 +1456,7 @@
           <a:p>
             <a:fld id="{82869989-EB00-4EE7-BCB5-25BDC5BB29F8}" type="slidenum">
               <a:rPr lang="en-US" smtClean="0"/>
-              <a:t>17</a:t>
+              <a:t>16</a:t>
             </a:fld>
             <a:endParaRPr lang="en-US"/>
           </a:p>
@@ -1309,7 +1465,7 @@
     </p:spTree>
     <p:extLst>
       <p:ext uri="{BB962C8B-B14F-4D97-AF65-F5344CB8AC3E}">
-        <p14:creationId xmlns:p14="http://schemas.microsoft.com/office/powerpoint/2010/main" val="848393650"/>
+        <p14:creationId xmlns:p14="http://schemas.microsoft.com/office/powerpoint/2010/main" val="974508889"/>
       </p:ext>
     </p:extLst>
   </p:cSld>
@@ -1365,11 +1521,27 @@
           <a:p>
             <a:r>
               <a:rPr lang="en-US" dirty="0" smtClean="0"/>
-              <a:t>Particularly powerful</a:t>
+              <a:t>We</a:t>
             </a:r>
             <a:r>
               <a:rPr lang="en-US" baseline="0" dirty="0" smtClean="0"/>
-              <a:t> if extend and =&lt;= have different performance and semantics</a:t>
+              <a:t> often don’t use the </a:t>
+            </a:r>
+            <a:r>
+              <a:rPr lang="en-US" baseline="0" dirty="0" err="1" smtClean="0"/>
+              <a:t>Comonad</a:t>
+            </a:r>
+            <a:r>
+              <a:rPr lang="en-US" baseline="0" dirty="0" smtClean="0"/>
+              <a:t> </a:t>
+            </a:r>
+            <a:r>
+              <a:rPr lang="en-US" baseline="0" dirty="0" err="1" smtClean="0"/>
+              <a:t>typeclass</a:t>
+            </a:r>
+            <a:r>
+              <a:rPr lang="en-US" baseline="0" dirty="0" smtClean="0"/>
+              <a:t>, and instead use specific concrete functions and utilize the math for reassurances</a:t>
             </a:r>
             <a:endParaRPr lang="en-US" dirty="0"/>
           </a:p>
@@ -1392,7 +1564,7 @@
           <a:p>
             <a:fld id="{82869989-EB00-4EE7-BCB5-25BDC5BB29F8}" type="slidenum">
               <a:rPr lang="en-US" smtClean="0"/>
-              <a:t>21</a:t>
+              <a:t>17</a:t>
             </a:fld>
             <a:endParaRPr lang="en-US"/>
           </a:p>
@@ -1401,7 +1573,7 @@
     </p:spTree>
     <p:extLst>
       <p:ext uri="{BB962C8B-B14F-4D97-AF65-F5344CB8AC3E}">
-        <p14:creationId xmlns:p14="http://schemas.microsoft.com/office/powerpoint/2010/main" val="3764930968"/>
+        <p14:creationId xmlns:p14="http://schemas.microsoft.com/office/powerpoint/2010/main" val="848393650"/>
       </p:ext>
     </p:extLst>
   </p:cSld>
@@ -1457,7 +1629,11 @@
           <a:p>
             <a:r>
               <a:rPr lang="en-US" dirty="0" smtClean="0"/>
-              <a:t>Another nice representation of images</a:t>
+              <a:t>Particularly powerful</a:t>
+            </a:r>
+            <a:r>
+              <a:rPr lang="en-US" baseline="0" dirty="0" smtClean="0"/>
+              <a:t> if extend and =&lt;= have different performance and semantics</a:t>
             </a:r>
             <a:endParaRPr lang="en-US" dirty="0"/>
           </a:p>
@@ -1480,7 +1656,7 @@
           <a:p>
             <a:fld id="{82869989-EB00-4EE7-BCB5-25BDC5BB29F8}" type="slidenum">
               <a:rPr lang="en-US" smtClean="0"/>
-              <a:t>24</a:t>
+              <a:t>21</a:t>
             </a:fld>
             <a:endParaRPr lang="en-US"/>
           </a:p>
@@ -1489,7 +1665,7 @@
     </p:spTree>
     <p:extLst>
       <p:ext uri="{BB962C8B-B14F-4D97-AF65-F5344CB8AC3E}">
-        <p14:creationId xmlns:p14="http://schemas.microsoft.com/office/powerpoint/2010/main" val="478620403"/>
+        <p14:creationId xmlns:p14="http://schemas.microsoft.com/office/powerpoint/2010/main" val="3764930968"/>
       </p:ext>
     </p:extLst>
   </p:cSld>
@@ -1545,7 +1721,7 @@
           <a:p>
             <a:r>
               <a:rPr lang="en-US" dirty="0" smtClean="0"/>
-              <a:t>They’re local filters!</a:t>
+              <a:t>Another nice representation of images</a:t>
             </a:r>
             <a:endParaRPr lang="en-US" dirty="0"/>
           </a:p>
@@ -1568,7 +1744,7 @@
           <a:p>
             <a:fld id="{82869989-EB00-4EE7-BCB5-25BDC5BB29F8}" type="slidenum">
               <a:rPr lang="en-US" smtClean="0"/>
-              <a:t>25</a:t>
+              <a:t>24</a:t>
             </a:fld>
             <a:endParaRPr lang="en-US"/>
           </a:p>
@@ -1577,7 +1753,7 @@
     </p:spTree>
     <p:extLst>
       <p:ext uri="{BB962C8B-B14F-4D97-AF65-F5344CB8AC3E}">
-        <p14:creationId xmlns:p14="http://schemas.microsoft.com/office/powerpoint/2010/main" val="3982211142"/>
+        <p14:creationId xmlns:p14="http://schemas.microsoft.com/office/powerpoint/2010/main" val="478620403"/>
       </p:ext>
     </p:extLst>
   </p:cSld>
@@ -15876,8 +16052,23 @@
             </a:r>
             <a:r>
               <a:rPr lang="en-US" dirty="0" smtClean="0"/>
-              <a:t> 2016, Boulder Colorado, Justin Le (http://jle.im)</a:t>
-            </a:r>
+              <a:t> 2016, Boulder Colorado, Justin Le (</a:t>
+            </a:r>
+            <a:r>
+              <a:rPr lang="en-US" dirty="0" smtClean="0">
+                <a:hlinkClick r:id="rId3"/>
+              </a:rPr>
+              <a:t>http://jle.im</a:t>
+            </a:r>
+            <a:r>
+              <a:rPr lang="en-US" dirty="0" smtClean="0"/>
+              <a:t>)</a:t>
+            </a:r>
+          </a:p>
+          <a:p>
+            <a:endParaRPr lang="en-US" dirty="0" smtClean="0"/>
+          </a:p>
+          <a:p>
             <a:endParaRPr lang="en-US" dirty="0"/>
           </a:p>
         </p:txBody>
@@ -20265,9 +20456,262 @@
   <p:timing>
     <p:tnLst>
       <p:par>
-        <p:cTn id="1" dur="indefinite" restart="never" nodeType="tmRoot"/>
+        <p:cTn id="1" dur="indefinite" restart="never" nodeType="tmRoot">
+          <p:childTnLst>
+            <p:seq concurrent="1" nextAc="seek">
+              <p:cTn id="2" dur="indefinite" nodeType="mainSeq">
+                <p:childTnLst>
+                  <p:par>
+                    <p:cTn id="3" fill="hold">
+                      <p:stCondLst>
+                        <p:cond delay="indefinite"/>
+                      </p:stCondLst>
+                      <p:childTnLst>
+                        <p:par>
+                          <p:cTn id="4" fill="hold">
+                            <p:stCondLst>
+                              <p:cond delay="0"/>
+                            </p:stCondLst>
+                            <p:childTnLst>
+                              <p:par>
+                                <p:cTn id="5" presetID="1" presetClass="entr" presetSubtype="0" fill="hold" grpId="0" nodeType="clickEffect">
+                                  <p:stCondLst>
+                                    <p:cond delay="0"/>
+                                  </p:stCondLst>
+                                  <p:childTnLst>
+                                    <p:set>
+                                      <p:cBhvr>
+                                        <p:cTn id="6" dur="1" fill="hold">
+                                          <p:stCondLst>
+                                            <p:cond delay="0"/>
+                                          </p:stCondLst>
+                                        </p:cTn>
+                                        <p:tgtEl>
+                                          <p:spTgt spid="3">
+                                            <p:txEl>
+                                              <p:pRg st="1" end="1"/>
+                                            </p:txEl>
+                                          </p:spTgt>
+                                        </p:tgtEl>
+                                        <p:attrNameLst>
+                                          <p:attrName>style.visibility</p:attrName>
+                                        </p:attrNameLst>
+                                      </p:cBhvr>
+                                      <p:to>
+                                        <p:strVal val="visible"/>
+                                      </p:to>
+                                    </p:set>
+                                  </p:childTnLst>
+                                </p:cTn>
+                              </p:par>
+                            </p:childTnLst>
+                          </p:cTn>
+                        </p:par>
+                      </p:childTnLst>
+                    </p:cTn>
+                  </p:par>
+                  <p:par>
+                    <p:cTn id="7" fill="hold">
+                      <p:stCondLst>
+                        <p:cond delay="indefinite"/>
+                      </p:stCondLst>
+                      <p:childTnLst>
+                        <p:par>
+                          <p:cTn id="8" fill="hold">
+                            <p:stCondLst>
+                              <p:cond delay="0"/>
+                            </p:stCondLst>
+                            <p:childTnLst>
+                              <p:par>
+                                <p:cTn id="9" presetID="1" presetClass="entr" presetSubtype="0" fill="hold" grpId="0" nodeType="clickEffect">
+                                  <p:stCondLst>
+                                    <p:cond delay="0"/>
+                                  </p:stCondLst>
+                                  <p:childTnLst>
+                                    <p:set>
+                                      <p:cBhvr>
+                                        <p:cTn id="10" dur="1" fill="hold">
+                                          <p:stCondLst>
+                                            <p:cond delay="0"/>
+                                          </p:stCondLst>
+                                        </p:cTn>
+                                        <p:tgtEl>
+                                          <p:spTgt spid="3">
+                                            <p:txEl>
+                                              <p:pRg st="2" end="2"/>
+                                            </p:txEl>
+                                          </p:spTgt>
+                                        </p:tgtEl>
+                                        <p:attrNameLst>
+                                          <p:attrName>style.visibility</p:attrName>
+                                        </p:attrNameLst>
+                                      </p:cBhvr>
+                                      <p:to>
+                                        <p:strVal val="visible"/>
+                                      </p:to>
+                                    </p:set>
+                                  </p:childTnLst>
+                                </p:cTn>
+                              </p:par>
+                              <p:par>
+                                <p:cTn id="11" presetID="1" presetClass="entr" presetSubtype="0" fill="hold" grpId="0" nodeType="withEffect">
+                                  <p:stCondLst>
+                                    <p:cond delay="0"/>
+                                  </p:stCondLst>
+                                  <p:childTnLst>
+                                    <p:set>
+                                      <p:cBhvr>
+                                        <p:cTn id="12" dur="1" fill="hold">
+                                          <p:stCondLst>
+                                            <p:cond delay="0"/>
+                                          </p:stCondLst>
+                                        </p:cTn>
+                                        <p:tgtEl>
+                                          <p:spTgt spid="3">
+                                            <p:txEl>
+                                              <p:pRg st="3" end="3"/>
+                                            </p:txEl>
+                                          </p:spTgt>
+                                        </p:tgtEl>
+                                        <p:attrNameLst>
+                                          <p:attrName>style.visibility</p:attrName>
+                                        </p:attrNameLst>
+                                      </p:cBhvr>
+                                      <p:to>
+                                        <p:strVal val="visible"/>
+                                      </p:to>
+                                    </p:set>
+                                  </p:childTnLst>
+                                </p:cTn>
+                              </p:par>
+                            </p:childTnLst>
+                          </p:cTn>
+                        </p:par>
+                      </p:childTnLst>
+                    </p:cTn>
+                  </p:par>
+                  <p:par>
+                    <p:cTn id="13" fill="hold">
+                      <p:stCondLst>
+                        <p:cond delay="indefinite"/>
+                      </p:stCondLst>
+                      <p:childTnLst>
+                        <p:par>
+                          <p:cTn id="14" fill="hold">
+                            <p:stCondLst>
+                              <p:cond delay="0"/>
+                            </p:stCondLst>
+                            <p:childTnLst>
+                              <p:par>
+                                <p:cTn id="15" presetID="1" presetClass="entr" presetSubtype="0" fill="hold" grpId="0" nodeType="clickEffect">
+                                  <p:stCondLst>
+                                    <p:cond delay="0"/>
+                                  </p:stCondLst>
+                                  <p:childTnLst>
+                                    <p:set>
+                                      <p:cBhvr>
+                                        <p:cTn id="16" dur="1" fill="hold">
+                                          <p:stCondLst>
+                                            <p:cond delay="0"/>
+                                          </p:stCondLst>
+                                        </p:cTn>
+                                        <p:tgtEl>
+                                          <p:spTgt spid="3">
+                                            <p:txEl>
+                                              <p:pRg st="4" end="4"/>
+                                            </p:txEl>
+                                          </p:spTgt>
+                                        </p:tgtEl>
+                                        <p:attrNameLst>
+                                          <p:attrName>style.visibility</p:attrName>
+                                        </p:attrNameLst>
+                                      </p:cBhvr>
+                                      <p:to>
+                                        <p:strVal val="visible"/>
+                                      </p:to>
+                                    </p:set>
+                                  </p:childTnLst>
+                                </p:cTn>
+                              </p:par>
+                            </p:childTnLst>
+                          </p:cTn>
+                        </p:par>
+                      </p:childTnLst>
+                    </p:cTn>
+                  </p:par>
+                  <p:par>
+                    <p:cTn id="17" fill="hold">
+                      <p:stCondLst>
+                        <p:cond delay="indefinite"/>
+                      </p:stCondLst>
+                      <p:childTnLst>
+                        <p:par>
+                          <p:cTn id="18" fill="hold">
+                            <p:stCondLst>
+                              <p:cond delay="0"/>
+                            </p:stCondLst>
+                            <p:childTnLst>
+                              <p:par>
+                                <p:cTn id="19" presetID="1" presetClass="entr" presetSubtype="0" fill="hold" grpId="0" nodeType="clickEffect">
+                                  <p:stCondLst>
+                                    <p:cond delay="0"/>
+                                  </p:stCondLst>
+                                  <p:childTnLst>
+                                    <p:set>
+                                      <p:cBhvr>
+                                        <p:cTn id="20" dur="1" fill="hold">
+                                          <p:stCondLst>
+                                            <p:cond delay="0"/>
+                                          </p:stCondLst>
+                                        </p:cTn>
+                                        <p:tgtEl>
+                                          <p:spTgt spid="3">
+                                            <p:txEl>
+                                              <p:pRg st="5" end="5"/>
+                                            </p:txEl>
+                                          </p:spTgt>
+                                        </p:tgtEl>
+                                        <p:attrNameLst>
+                                          <p:attrName>style.visibility</p:attrName>
+                                        </p:attrNameLst>
+                                      </p:cBhvr>
+                                      <p:to>
+                                        <p:strVal val="visible"/>
+                                      </p:to>
+                                    </p:set>
+                                  </p:childTnLst>
+                                </p:cTn>
+                              </p:par>
+                            </p:childTnLst>
+                          </p:cTn>
+                        </p:par>
+                      </p:childTnLst>
+                    </p:cTn>
+                  </p:par>
+                </p:childTnLst>
+              </p:cTn>
+              <p:prevCondLst>
+                <p:cond evt="onPrev" delay="0">
+                  <p:tgtEl>
+                    <p:sldTgt/>
+                  </p:tgtEl>
+                </p:cond>
+              </p:prevCondLst>
+              <p:nextCondLst>
+                <p:cond evt="onNext" delay="0">
+                  <p:tgtEl>
+                    <p:sldTgt/>
+                  </p:tgtEl>
+                </p:cond>
+              </p:nextCondLst>
+            </p:seq>
+          </p:childTnLst>
+        </p:cTn>
       </p:par>
     </p:tnLst>
+    <p:bldLst>
+      <p:bldP spid="3" grpId="0" uiExpand="1" build="p"/>
+    </p:bldLst>
   </p:timing>
 </p:sld>
 </file>
@@ -20306,7 +20750,7 @@
           <a:p>
             <a:r>
               <a:rPr lang="en-US" dirty="0" smtClean="0"/>
-              <a:t>Arrows</a:t>
+              <a:t>Arrows as Filters</a:t>
             </a:r>
             <a:endParaRPr lang="en-US" dirty="0"/>
           </a:p>
@@ -20340,7 +20784,13 @@
               <a:rPr lang="en-US" dirty="0" smtClean="0">
                 <a:latin typeface="+mj-lt"/>
               </a:rPr>
-              <a:t>As a filter: “Specify the new pixel value at that location”</a:t>
+              <a:t>“</a:t>
+            </a:r>
+            <a:r>
+              <a:rPr lang="en-US" dirty="0" smtClean="0">
+                <a:latin typeface="+mj-lt"/>
+              </a:rPr>
+              <a:t>Specify the new pixel value at that location”</a:t>
             </a:r>
           </a:p>
           <a:p>
@@ -21299,9 +21749,6 @@
               </a:rPr>
               <a:t>)</a:t>
             </a:r>
-            <a:endParaRPr lang="en-US" dirty="0">
-              <a:latin typeface="Lucida Console" panose="020B0609040504020204" pitchFamily="49" charset="0"/>
-            </a:endParaRPr>
           </a:p>
         </p:txBody>
       </p:sp>
@@ -21544,22 +21991,102 @@
           </a:p>
         </p:txBody>
       </p:sp>
-      <p:sp>
-        <p:nvSpPr>
-          <p:cNvPr id="3" name="Content Placeholder 2"/>
-          <p:cNvSpPr>
-            <a:spLocks noGrp="1"/>
-          </p:cNvSpPr>
+      <p:pic>
+        <p:nvPicPr>
+          <p:cNvPr id="1026" name="Picture 2" descr="http://vignette3.wikia.nocookie.net/memoryalpha/images/a/a7/Spock_(mirror).jpg/revision/latest?cb=20090220220251&amp;path-prefix=en"/>
+          <p:cNvPicPr>
+            <a:picLocks noGrp="1" noChangeAspect="1" noChangeArrowheads="1"/>
+          </p:cNvPicPr>
           <p:nvPr>
             <p:ph idx="1"/>
           </p:nvPr>
+        </p:nvPicPr>
+        <p:blipFill>
+          <a:blip r:embed="rId3">
+            <a:extLst>
+              <a:ext uri="{28A0092B-C50C-407E-A947-70E740481C1C}">
+                <a14:useLocalDpi xmlns:a14="http://schemas.microsoft.com/office/drawing/2010/main" val="0"/>
+              </a:ext>
+            </a:extLst>
+          </a:blip>
+          <a:srcRect/>
+          <a:stretch>
+            <a:fillRect/>
+          </a:stretch>
+        </p:blipFill>
+        <p:spPr bwMode="auto">
+          <a:xfrm>
+            <a:off x="3546039" y="1981200"/>
+            <a:ext cx="5099921" cy="3810000"/>
+          </a:xfrm>
+          <a:prstGeom prst="rect">
+            <a:avLst/>
+          </a:prstGeom>
+          <a:noFill/>
+          <a:extLst>
+            <a:ext uri="{909E8E84-426E-40DD-AFC4-6F175D3DCCD1}">
+              <a14:hiddenFill xmlns:a14="http://schemas.microsoft.com/office/drawing/2010/main">
+                <a:solidFill>
+                  <a:srgbClr val="FFFFFF"/>
+                </a:solidFill>
+              </a14:hiddenFill>
+            </a:ext>
+          </a:extLst>
+        </p:spPr>
+      </p:pic>
+      <p:sp>
+        <p:nvSpPr>
+          <p:cNvPr id="5" name="Shape 120"/>
+          <p:cNvSpPr txBox="1"/>
+          <p:nvPr/>
         </p:nvSpPr>
-        <p:spPr/>
+        <p:spPr>
+          <a:xfrm>
+            <a:off x="7490130" y="5791200"/>
+            <a:ext cx="1155830" cy="334962"/>
+          </a:xfrm>
+          <a:prstGeom prst="rect">
+            <a:avLst/>
+          </a:prstGeom>
+          <a:noFill/>
+          <a:ln>
+            <a:noFill/>
+          </a:ln>
+        </p:spPr>
         <p:txBody>
-          <a:bodyPr/>
+          <a:bodyPr lIns="91425" tIns="45700" rIns="91425" bIns="45700" anchor="t" anchorCtr="0">
+            <a:noAutofit/>
+          </a:bodyPr>
           <a:lstStyle/>
           <a:p>
-            <a:endParaRPr lang="en-US"/>
+            <a:pPr marL="0" marR="0" lvl="0" indent="0" algn="l" rtl="0">
+              <a:spcBef>
+                <a:spcPts val="0"/>
+              </a:spcBef>
+              <a:buSzPct val="25000"/>
+              <a:buNone/>
+            </a:pPr>
+            <a:r>
+              <a:rPr lang="en-US" sz="1400" b="0" u="none" strike="noStrike" cap="none" dirty="0" smtClean="0">
+                <a:solidFill>
+                  <a:schemeClr val="dk1"/>
+                </a:solidFill>
+                <a:latin typeface="Lucida Console" panose="020B0609040504020204" pitchFamily="49" charset="0"/>
+                <a:ea typeface="Calibri"/>
+                <a:cs typeface="Calibri"/>
+                <a:sym typeface="Calibri"/>
+              </a:rPr>
+              <a:t>Star Trek</a:t>
+            </a:r>
+            <a:endParaRPr lang="vi-VN" sz="1400" b="0" u="none" strike="noStrike" cap="none" dirty="0">
+              <a:solidFill>
+                <a:schemeClr val="dk1"/>
+              </a:solidFill>
+              <a:latin typeface="Calibri"/>
+              <a:ea typeface="Calibri"/>
+              <a:cs typeface="Calibri"/>
+              <a:sym typeface="Calibri"/>
+            </a:endParaRPr>
           </a:p>
         </p:txBody>
       </p:sp>
@@ -23612,8 +24139,9 @@
             <a:pPr lvl="1"/>
             <a:r>
               <a:rPr lang="en-US" dirty="0" smtClean="0"/>
-              <a:t>Boundary conditions</a:t>
-            </a:r>
+              <a:t>Behavior at boundaries</a:t>
+            </a:r>
+            <a:endParaRPr lang="en-US" dirty="0" smtClean="0"/>
           </a:p>
           <a:p>
             <a:r>
@@ -23768,11 +24296,31 @@
           <a:bodyPr/>
           <a:lstStyle/>
           <a:p>
+            <a:pPr marL="0" indent="0">
+              <a:buNone/>
+            </a:pPr>
+            <a:r>
+              <a:rPr lang="en-US" sz="2800" dirty="0" smtClean="0">
+                <a:latin typeface="+mj-lt"/>
+              </a:rPr>
+              <a:t>Comonads</a:t>
+            </a:r>
+            <a:endParaRPr lang="en-US" dirty="0" smtClean="0">
+              <a:latin typeface="+mj-lt"/>
+            </a:endParaRPr>
+          </a:p>
+          <a:p>
             <a:r>
               <a:rPr lang="en-US" dirty="0" smtClean="0">
                 <a:latin typeface="Lucida Console" panose="020B0609040504020204" pitchFamily="49" charset="0"/>
               </a:rPr>
-              <a:t>extend extract = id</a:t>
+              <a:t>extend </a:t>
+            </a:r>
+            <a:r>
+              <a:rPr lang="en-US" dirty="0" smtClean="0">
+                <a:latin typeface="Lucida Console" panose="020B0609040504020204" pitchFamily="49" charset="0"/>
+              </a:rPr>
+              <a:t>extract = id</a:t>
             </a:r>
           </a:p>
           <a:p>
@@ -23796,7 +24344,21 @@
               <a:rPr lang="en-US" dirty="0" smtClean="0">
                 <a:latin typeface="+mj-lt"/>
               </a:rPr>
-              <a:t>etc.</a:t>
+              <a:t>etc</a:t>
+            </a:r>
+            <a:r>
+              <a:rPr lang="en-US" dirty="0" smtClean="0">
+                <a:latin typeface="+mj-lt"/>
+              </a:rPr>
+              <a:t>.</a:t>
+            </a:r>
+          </a:p>
+          <a:p>
+            <a:r>
+              <a:rPr lang="en-US" dirty="0" smtClean="0">
+                <a:latin typeface="+mj-lt"/>
+              </a:rPr>
+              <a:t>(Just trust me)</a:t>
             </a:r>
             <a:endParaRPr lang="en-US" dirty="0">
               <a:latin typeface="+mj-lt"/>
@@ -23819,11 +24381,41 @@
           <a:bodyPr/>
           <a:lstStyle/>
           <a:p>
+            <a:pPr marL="0" indent="0">
+              <a:buNone/>
+            </a:pPr>
+            <a:r>
+              <a:rPr lang="en-US" sz="2800" dirty="0">
+                <a:solidFill>
+                  <a:srgbClr val="2D2E2D"/>
+                </a:solidFill>
+              </a:rPr>
+              <a:t>M</a:t>
+            </a:r>
+            <a:r>
+              <a:rPr lang="en-US" sz="2800" dirty="0" smtClean="0">
+                <a:solidFill>
+                  <a:srgbClr val="2D2E2D"/>
+                </a:solidFill>
+              </a:rPr>
+              <a:t>onads</a:t>
+            </a:r>
+            <a:endParaRPr lang="en-US" dirty="0" smtClean="0">
+              <a:latin typeface="Lucida Console" panose="020B0609040504020204" pitchFamily="49" charset="0"/>
+            </a:endParaRPr>
+          </a:p>
+          <a:p>
             <a:r>
               <a:rPr lang="en-US" dirty="0" smtClean="0">
                 <a:latin typeface="Lucida Console" panose="020B0609040504020204" pitchFamily="49" charset="0"/>
               </a:rPr>
-              <a:t>bind return  = id</a:t>
+              <a:t>bind </a:t>
+            </a:r>
+            <a:r>
+              <a:rPr lang="en-US" dirty="0" smtClean="0">
+                <a:latin typeface="Lucida Console" panose="020B0609040504020204" pitchFamily="49" charset="0"/>
+              </a:rPr>
+              <a:t>return  = id</a:t>
             </a:r>
           </a:p>
           <a:p>
@@ -24685,7 +25277,11 @@
           <a:p>
             <a:r>
               <a:rPr lang="en-US" dirty="0" smtClean="0"/>
-              <a:t>Local Filters</a:t>
+              <a:t>Arrows as Local </a:t>
+            </a:r>
+            <a:r>
+              <a:rPr lang="en-US" dirty="0" smtClean="0"/>
+              <a:t>Filters</a:t>
             </a:r>
             <a:endParaRPr lang="en-US" dirty="0"/>
           </a:p>
@@ -24793,10 +25389,16 @@
           </a:p>
           <a:p>
             <a:r>
+              <a:rPr lang="en-US" dirty="0" err="1" smtClean="0">
+                <a:latin typeface="Lucida Console" panose="020B0609040504020204" pitchFamily="49" charset="0"/>
+              </a:rPr>
+              <a:t>deriv</a:t>
+            </a:r>
+            <a:r>
               <a:rPr lang="en-US" dirty="0" smtClean="0">
                 <a:latin typeface="Lucida Console" panose="020B0609040504020204" pitchFamily="49" charset="0"/>
               </a:rPr>
-              <a:t>diff </a:t>
+              <a:t> </a:t>
             </a:r>
             <a:r>
               <a:rPr lang="en-US" dirty="0" smtClean="0">
@@ -24819,10 +25421,22 @@
               </a:rPr>
             </a:br>
             <a:r>
+              <a:rPr lang="en-US" dirty="0" err="1" smtClean="0">
+                <a:latin typeface="Lucida Console" panose="020B0609040504020204" pitchFamily="49" charset="0"/>
+              </a:rPr>
+              <a:t>deriv</a:t>
+            </a:r>
+            <a:r>
               <a:rPr lang="en-US" dirty="0" smtClean="0">
                 <a:latin typeface="Lucida Console" panose="020B0609040504020204" pitchFamily="49" charset="0"/>
               </a:rPr>
-              <a:t>diff (Tape (l:_) v (r:_)) = ((v – l) + (r – v)) / 2</a:t>
+              <a:t> </a:t>
+            </a:r>
+            <a:r>
+              <a:rPr lang="en-US" dirty="0" smtClean="0">
+                <a:latin typeface="Lucida Console" panose="020B0609040504020204" pitchFamily="49" charset="0"/>
+              </a:rPr>
+              <a:t>(Tape (l:_) v (r:_)) = ((v – l) + (r – v)) / 2</a:t>
             </a:r>
           </a:p>
         </p:txBody>
@@ -25050,19 +25664,43 @@
               <a:rPr lang="en-US" dirty="0" smtClean="0">
                 <a:latin typeface="Lucida Console" panose="020B0609040504020204" pitchFamily="49" charset="0"/>
               </a:rPr>
-              <a:t>) = f &lt;$&gt; iterate </a:t>
+              <a:t>) = </a:t>
             </a:r>
             <a:r>
               <a:rPr lang="en-US" dirty="0" err="1" smtClean="0">
                 <a:latin typeface="Lucida Console" panose="020B0609040504020204" pitchFamily="49" charset="0"/>
               </a:rPr>
+              <a:t>fmap</a:t>
+            </a:r>
+            <a:r>
+              <a:rPr lang="en-US" dirty="0" smtClean="0">
+                <a:latin typeface="Lucida Console" panose="020B0609040504020204" pitchFamily="49" charset="0"/>
+              </a:rPr>
+              <a:t> f (iterate </a:t>
+            </a:r>
+            <a:r>
+              <a:rPr lang="en-US" dirty="0" err="1" smtClean="0">
+                <a:latin typeface="Lucida Console" panose="020B0609040504020204" pitchFamily="49" charset="0"/>
+              </a:rPr>
               <a:t>shiftRight</a:t>
             </a:r>
             <a:r>
               <a:rPr lang="en-US" dirty="0" smtClean="0">
                 <a:latin typeface="Lucida Console" panose="020B0609040504020204" pitchFamily="49" charset="0"/>
               </a:rPr>
-              <a:t> t</a:t>
+              <a:t> </a:t>
+            </a:r>
+            <a:r>
+              <a:rPr lang="en-US" dirty="0" smtClean="0">
+                <a:latin typeface="Lucida Console" panose="020B0609040504020204" pitchFamily="49" charset="0"/>
+              </a:rPr>
+              <a:t>t)</a:t>
+            </a:r>
+            <a:r>
+              <a:rPr lang="en-US" dirty="0" smtClean="0">
+                <a:latin typeface="Lucida Console" panose="020B0609040504020204" pitchFamily="49" charset="0"/>
+              </a:rPr>
+              <a:t/>
             </a:r>
             <a:br>
               <a:rPr lang="en-US" dirty="0" smtClean="0">
@@ -25085,40 +25723,100 @@
               <a:rPr lang="en-US" dirty="0" smtClean="0">
                 <a:latin typeface="Lucida Console" panose="020B0609040504020204" pitchFamily="49" charset="0"/>
               </a:rPr>
-              <a:t>) = f &lt;$&gt; iterate </a:t>
+              <a:t>) = </a:t>
             </a:r>
             <a:r>
               <a:rPr lang="en-US" dirty="0" err="1" smtClean="0">
                 <a:latin typeface="Lucida Console" panose="020B0609040504020204" pitchFamily="49" charset="0"/>
               </a:rPr>
+              <a:t>fmap</a:t>
+            </a:r>
+            <a:r>
+              <a:rPr lang="en-US" dirty="0" smtClean="0">
+                <a:latin typeface="Lucida Console" panose="020B0609040504020204" pitchFamily="49" charset="0"/>
+              </a:rPr>
+              <a:t> f (iterate </a:t>
+            </a:r>
+            <a:r>
+              <a:rPr lang="en-US" dirty="0" err="1" smtClean="0">
+                <a:latin typeface="Lucida Console" panose="020B0609040504020204" pitchFamily="49" charset="0"/>
+              </a:rPr>
               <a:t>shiftLeft</a:t>
             </a:r>
             <a:r>
               <a:rPr lang="en-US" dirty="0" smtClean="0">
                 <a:latin typeface="Lucida Console" panose="020B0609040504020204" pitchFamily="49" charset="0"/>
               </a:rPr>
-              <a:t>  t</a:t>
-            </a:r>
-          </a:p>
-          <a:p>
+              <a:t>  </a:t>
+            </a:r>
             <a:r>
               <a:rPr lang="en-US" dirty="0" smtClean="0">
-                <a:latin typeface="+mj-lt"/>
-              </a:rPr>
-              <a:t>The power of composition</a:t>
+                <a:latin typeface="Lucida Console" panose="020B0609040504020204" pitchFamily="49" charset="0"/>
+              </a:rPr>
+              <a:t>t)</a:t>
             </a:r>
             <a:endParaRPr lang="en-US" dirty="0" smtClean="0">
               <a:latin typeface="Lucida Console" panose="020B0609040504020204" pitchFamily="49" charset="0"/>
             </a:endParaRPr>
           </a:p>
           <a:p>
+            <a:r>
+              <a:rPr lang="en-US" dirty="0" smtClean="0">
+                <a:latin typeface="+mj-lt"/>
+              </a:rPr>
+              <a:t>The power of composition</a:t>
+            </a:r>
+            <a:endParaRPr lang="en-US" dirty="0" smtClean="0">
+              <a:latin typeface="Lucida Console" panose="020B0609040504020204" pitchFamily="49" charset="0"/>
+            </a:endParaRPr>
+          </a:p>
+          <a:p>
             <a:pPr lvl="1"/>
             <a:r>
               <a:rPr lang="en-US" dirty="0" smtClean="0">
                 <a:latin typeface="Lucida Console" panose="020B0609040504020204" pitchFamily="49" charset="0"/>
               </a:rPr>
-              <a:t>diff2     = diff &lt;=&lt; diff</a:t>
-            </a:r>
+              <a:t>deriv2</a:t>
+            </a:r>
+            <a:r>
+              <a:rPr lang="en-US" dirty="0" smtClean="0">
+                <a:latin typeface="Lucida Console" panose="020B0609040504020204" pitchFamily="49" charset="0"/>
+              </a:rPr>
+              <a:t>     </a:t>
+            </a:r>
+            <a:r>
+              <a:rPr lang="en-US" dirty="0" smtClean="0">
+                <a:latin typeface="Lucida Console" panose="020B0609040504020204" pitchFamily="49" charset="0"/>
+              </a:rPr>
+              <a:t>= </a:t>
+            </a:r>
+            <a:r>
+              <a:rPr lang="en-US" dirty="0" err="1" smtClean="0">
+                <a:latin typeface="Lucida Console" panose="020B0609040504020204" pitchFamily="49" charset="0"/>
+              </a:rPr>
+              <a:t>deriv</a:t>
+            </a:r>
+            <a:r>
+              <a:rPr lang="en-US" dirty="0" smtClean="0">
+                <a:latin typeface="Lucida Console" panose="020B0609040504020204" pitchFamily="49" charset="0"/>
+              </a:rPr>
+              <a:t> </a:t>
+            </a:r>
+            <a:r>
+              <a:rPr lang="en-US" dirty="0" smtClean="0">
+                <a:latin typeface="Lucida Console" panose="020B0609040504020204" pitchFamily="49" charset="0"/>
+              </a:rPr>
+              <a:t>&lt;=&lt; </a:t>
+            </a:r>
+            <a:r>
+              <a:rPr lang="en-US" dirty="0" err="1" smtClean="0">
+                <a:latin typeface="Lucida Console" panose="020B0609040504020204" pitchFamily="49" charset="0"/>
+              </a:rPr>
+              <a:t>deriv</a:t>
+            </a:r>
+            <a:endParaRPr lang="en-US" dirty="0" smtClean="0">
+              <a:latin typeface="Lucida Console" panose="020B0609040504020204" pitchFamily="49" charset="0"/>
+            </a:endParaRPr>
           </a:p>
         </p:txBody>
       </p:sp>
@@ -25533,37 +26231,58 @@
               <a:rPr lang="en-US" dirty="0" smtClean="0">
                 <a:latin typeface="+mj-lt"/>
               </a:rPr>
-              <a:t>, where the morphism mapping action is </a:t>
-            </a:r>
-            <a:r>
-              <a:rPr lang="en-US" dirty="0" smtClean="0">
-                <a:latin typeface="Lucida Console" panose="020B0609040504020204" pitchFamily="49" charset="0"/>
-              </a:rPr>
-              <a:t>globalize d</a:t>
+              <a:t>, where the morphism </a:t>
             </a:r>
             <a:r>
               <a:rPr lang="en-US" dirty="0" smtClean="0">
                 <a:latin typeface="+mj-lt"/>
               </a:rPr>
-              <a:t>.</a:t>
-            </a:r>
-          </a:p>
-          <a:p>
+              <a:t>mapper </a:t>
+            </a:r>
             <a:r>
               <a:rPr lang="en-US" dirty="0" smtClean="0">
                 <a:latin typeface="+mj-lt"/>
               </a:rPr>
-              <a:t>We have some choices!</a:t>
-            </a:r>
-          </a:p>
-          <a:p>
-            <a:pPr lvl="1"/>
+              <a:t>is </a:t>
+            </a:r>
+            <a:r>
+              <a:rPr lang="en-US" dirty="0" smtClean="0">
+                <a:latin typeface="Lucida Console" panose="020B0609040504020204" pitchFamily="49" charset="0"/>
+              </a:rPr>
+              <a:t>globalize d</a:t>
+            </a:r>
             <a:r>
               <a:rPr lang="en-US" dirty="0" smtClean="0">
                 <a:latin typeface="+mj-lt"/>
               </a:rPr>
-              <a:t>Boundary conditions?</a:t>
-            </a:r>
+              <a:t>.</a:t>
+            </a:r>
+          </a:p>
+          <a:p>
+            <a:r>
+              <a:rPr lang="en-US" dirty="0" smtClean="0">
+                <a:latin typeface="+mj-lt"/>
+              </a:rPr>
+              <a:t>We have some choices!</a:t>
+            </a:r>
+          </a:p>
+          <a:p>
+            <a:pPr lvl="1"/>
+            <a:r>
+              <a:rPr lang="en-US" dirty="0" smtClean="0">
+                <a:latin typeface="+mj-lt"/>
+              </a:rPr>
+              <a:t>Boundary </a:t>
+            </a:r>
+            <a:r>
+              <a:rPr lang="en-US" dirty="0" smtClean="0">
+                <a:latin typeface="+mj-lt"/>
+              </a:rPr>
+              <a:t>behaviors?</a:t>
+            </a:r>
+            <a:endParaRPr lang="en-US" dirty="0" smtClean="0">
+              <a:latin typeface="+mj-lt"/>
+            </a:endParaRPr>
           </a:p>
         </p:txBody>
       </p:sp>
@@ -25786,7 +26505,7 @@
                                         <p:tgtEl>
                                           <p:spTgt spid="3">
                                             <p:txEl>
-                                              <p:pRg st="0" end="0"/>
+                                              <p:pRg st="4" end="4"/>
                                             </p:txEl>
                                           </p:spTgt>
                                         </p:tgtEl>
@@ -25801,39 +26520,26 @@
                                   </p:childTnLst>
                                 </p:cTn>
                               </p:par>
+                            </p:childTnLst>
+                          </p:cTn>
+                        </p:par>
+                      </p:childTnLst>
+                    </p:cTn>
+                  </p:par>
+                  <p:par>
+                    <p:cTn id="7" fill="hold">
+                      <p:stCondLst>
+                        <p:cond delay="indefinite"/>
+                      </p:stCondLst>
+                      <p:childTnLst>
+                        <p:par>
+                          <p:cTn id="8" fill="hold">
+                            <p:stCondLst>
+                              <p:cond delay="0"/>
+                            </p:stCondLst>
+                            <p:childTnLst>
                               <p:par>
-                                <p:cTn id="7" presetID="1" presetClass="entr" presetSubtype="0" fill="hold" grpId="0" nodeType="withEffect">
-                                  <p:stCondLst>
-                                    <p:cond delay="0"/>
-                                  </p:stCondLst>
-                                  <p:childTnLst>
-                                    <p:set>
-                                      <p:cBhvr>
-                                        <p:cTn id="8" dur="1" fill="hold">
-                                          <p:stCondLst>
-                                            <p:cond delay="0"/>
-                                          </p:stCondLst>
-                                        </p:cTn>
-                                        <p:tgtEl>
-                                          <p:spTgt spid="3">
-                                            <p:txEl>
-                                              <p:pRg st="1" end="1"/>
-                                            </p:txEl>
-                                          </p:spTgt>
-                                        </p:tgtEl>
-                                        <p:attrNameLst>
-                                          <p:attrName>style.visibility</p:attrName>
-                                        </p:attrNameLst>
-                                      </p:cBhvr>
-                                      <p:to>
-                                        <p:strVal val="visible"/>
-                                      </p:to>
-                                    </p:set>
-                                  </p:childTnLst>
-                                </p:cTn>
-                              </p:par>
-                              <p:par>
-                                <p:cTn id="9" presetID="1" presetClass="entr" presetSubtype="0" fill="hold" grpId="0" nodeType="withEffect">
+                                <p:cTn id="9" presetID="1" presetClass="entr" presetSubtype="0" fill="hold" grpId="0" nodeType="clickEffect">
                                   <p:stCondLst>
                                     <p:cond delay="0"/>
                                   </p:stCondLst>
@@ -25848,7 +26554,7 @@
                                         <p:tgtEl>
                                           <p:spTgt spid="3">
                                             <p:txEl>
-                                              <p:pRg st="2" end="2"/>
+                                              <p:pRg st="5" end="5"/>
                                             </p:txEl>
                                           </p:spTgt>
                                         </p:tgtEl>
@@ -25879,135 +26585,6 @@
                                         <p:tgtEl>
                                           <p:spTgt spid="3">
                                             <p:txEl>
-                                              <p:pRg st="3" end="3"/>
-                                            </p:txEl>
-                                          </p:spTgt>
-                                        </p:tgtEl>
-                                        <p:attrNameLst>
-                                          <p:attrName>style.visibility</p:attrName>
-                                        </p:attrNameLst>
-                                      </p:cBhvr>
-                                      <p:to>
-                                        <p:strVal val="visible"/>
-                                      </p:to>
-                                    </p:set>
-                                  </p:childTnLst>
-                                </p:cTn>
-                              </p:par>
-                            </p:childTnLst>
-                          </p:cTn>
-                        </p:par>
-                      </p:childTnLst>
-                    </p:cTn>
-                  </p:par>
-                  <p:par>
-                    <p:cTn id="13" fill="hold">
-                      <p:stCondLst>
-                        <p:cond delay="indefinite"/>
-                      </p:stCondLst>
-                      <p:childTnLst>
-                        <p:par>
-                          <p:cTn id="14" fill="hold">
-                            <p:stCondLst>
-                              <p:cond delay="0"/>
-                            </p:stCondLst>
-                            <p:childTnLst>
-                              <p:par>
-                                <p:cTn id="15" presetID="1" presetClass="entr" presetSubtype="0" fill="hold" grpId="0" nodeType="clickEffect">
-                                  <p:stCondLst>
-                                    <p:cond delay="0"/>
-                                  </p:stCondLst>
-                                  <p:childTnLst>
-                                    <p:set>
-                                      <p:cBhvr>
-                                        <p:cTn id="16" dur="1" fill="hold">
-                                          <p:stCondLst>
-                                            <p:cond delay="0"/>
-                                          </p:stCondLst>
-                                        </p:cTn>
-                                        <p:tgtEl>
-                                          <p:spTgt spid="3">
-                                            <p:txEl>
-                                              <p:pRg st="4" end="4"/>
-                                            </p:txEl>
-                                          </p:spTgt>
-                                        </p:tgtEl>
-                                        <p:attrNameLst>
-                                          <p:attrName>style.visibility</p:attrName>
-                                        </p:attrNameLst>
-                                      </p:cBhvr>
-                                      <p:to>
-                                        <p:strVal val="visible"/>
-                                      </p:to>
-                                    </p:set>
-                                  </p:childTnLst>
-                                </p:cTn>
-                              </p:par>
-                            </p:childTnLst>
-                          </p:cTn>
-                        </p:par>
-                      </p:childTnLst>
-                    </p:cTn>
-                  </p:par>
-                  <p:par>
-                    <p:cTn id="17" fill="hold">
-                      <p:stCondLst>
-                        <p:cond delay="indefinite"/>
-                      </p:stCondLst>
-                      <p:childTnLst>
-                        <p:par>
-                          <p:cTn id="18" fill="hold">
-                            <p:stCondLst>
-                              <p:cond delay="0"/>
-                            </p:stCondLst>
-                            <p:childTnLst>
-                              <p:par>
-                                <p:cTn id="19" presetID="1" presetClass="entr" presetSubtype="0" fill="hold" grpId="0" nodeType="clickEffect">
-                                  <p:stCondLst>
-                                    <p:cond delay="0"/>
-                                  </p:stCondLst>
-                                  <p:childTnLst>
-                                    <p:set>
-                                      <p:cBhvr>
-                                        <p:cTn id="20" dur="1" fill="hold">
-                                          <p:stCondLst>
-                                            <p:cond delay="0"/>
-                                          </p:stCondLst>
-                                        </p:cTn>
-                                        <p:tgtEl>
-                                          <p:spTgt spid="3">
-                                            <p:txEl>
-                                              <p:pRg st="5" end="5"/>
-                                            </p:txEl>
-                                          </p:spTgt>
-                                        </p:tgtEl>
-                                        <p:attrNameLst>
-                                          <p:attrName>style.visibility</p:attrName>
-                                        </p:attrNameLst>
-                                      </p:cBhvr>
-                                      <p:to>
-                                        <p:strVal val="visible"/>
-                                      </p:to>
-                                    </p:set>
-                                  </p:childTnLst>
-                                </p:cTn>
-                              </p:par>
-                              <p:par>
-                                <p:cTn id="21" presetID="1" presetClass="entr" presetSubtype="0" fill="hold" grpId="0" nodeType="withEffect">
-                                  <p:stCondLst>
-                                    <p:cond delay="0"/>
-                                  </p:stCondLst>
-                                  <p:childTnLst>
-                                    <p:set>
-                                      <p:cBhvr>
-                                        <p:cTn id="22" dur="1" fill="hold">
-                                          <p:stCondLst>
-                                            <p:cond delay="0"/>
-                                          </p:stCondLst>
-                                        </p:cTn>
-                                        <p:tgtEl>
-                                          <p:spTgt spid="3">
-                                            <p:txEl>
                                               <p:pRg st="6" end="6"/>
                                             </p:txEl>
                                           </p:spTgt>
@@ -26024,14 +26601,14 @@
                                 </p:cTn>
                               </p:par>
                               <p:par>
-                                <p:cTn id="23" presetID="1" presetClass="entr" presetSubtype="0" fill="hold" grpId="0" nodeType="withEffect">
+                                <p:cTn id="13" presetID="1" presetClass="entr" presetSubtype="0" fill="hold" grpId="0" nodeType="withEffect">
                                   <p:stCondLst>
                                     <p:cond delay="0"/>
                                   </p:stCondLst>
                                   <p:childTnLst>
                                     <p:set>
                                       <p:cBhvr>
-                                        <p:cTn id="24" dur="1" fill="hold">
+                                        <p:cTn id="14" dur="1" fill="hold">
                                           <p:stCondLst>
                                             <p:cond delay="0"/>
                                           </p:stCondLst>
@@ -26055,14 +26632,14 @@
                                 </p:cTn>
                               </p:par>
                               <p:par>
-                                <p:cTn id="25" presetID="1" presetClass="entr" presetSubtype="0" fill="hold" grpId="0" nodeType="withEffect">
+                                <p:cTn id="15" presetID="1" presetClass="entr" presetSubtype="0" fill="hold" grpId="0" nodeType="withEffect">
                                   <p:stCondLst>
                                     <p:cond delay="0"/>
                                   </p:stCondLst>
                                   <p:childTnLst>
                                     <p:set>
                                       <p:cBhvr>
-                                        <p:cTn id="26" dur="1" fill="hold">
+                                        <p:cTn id="16" dur="1" fill="hold">
                                           <p:stCondLst>
                                             <p:cond delay="0"/>
                                           </p:stCondLst>
@@ -26113,7 +26690,7 @@
       </p:par>
     </p:tnLst>
     <p:bldLst>
-      <p:bldP spid="3" grpId="0" build="p"/>
+      <p:bldP spid="3" grpId="0" uiExpand="1" build="p"/>
     </p:bldLst>
   </p:timing>
 </p:sld>
@@ -26800,6 +27377,154 @@
 </p:sld>
 </file>
 
+<file path=ppt/slides/slide30.xml><?xml version="1.0" encoding="utf-8"?>
+<p:sld xmlns:a="http://schemas.openxmlformats.org/drawingml/2006/main" xmlns:r="http://schemas.openxmlformats.org/officeDocument/2006/relationships" xmlns:p="http://schemas.openxmlformats.org/presentationml/2006/main">
+  <p:cSld>
+    <p:spTree>
+      <p:nvGrpSpPr>
+        <p:cNvPr id="1" name=""/>
+        <p:cNvGrpSpPr/>
+        <p:nvPr/>
+      </p:nvGrpSpPr>
+      <p:grpSpPr>
+        <a:xfrm>
+          <a:off x="0" y="0"/>
+          <a:ext cx="0" cy="0"/>
+          <a:chOff x="0" y="0"/>
+          <a:chExt cx="0" cy="0"/>
+        </a:xfrm>
+      </p:grpSpPr>
+      <p:sp>
+        <p:nvSpPr>
+          <p:cNvPr id="2" name="Title 1"/>
+          <p:cNvSpPr>
+            <a:spLocks noGrp="1"/>
+          </p:cNvSpPr>
+          <p:nvPr>
+            <p:ph type="title"/>
+          </p:nvPr>
+        </p:nvSpPr>
+        <p:spPr/>
+        <p:txBody>
+          <a:bodyPr/>
+          <a:lstStyle/>
+          <a:p>
+            <a:r>
+              <a:rPr lang="en-US" dirty="0" smtClean="0"/>
+              <a:t>More Resources</a:t>
+            </a:r>
+            <a:endParaRPr lang="en-US" dirty="0"/>
+          </a:p>
+        </p:txBody>
+      </p:sp>
+      <p:sp>
+        <p:nvSpPr>
+          <p:cNvPr id="3" name="Content Placeholder 2"/>
+          <p:cNvSpPr>
+            <a:spLocks noGrp="1"/>
+          </p:cNvSpPr>
+          <p:nvPr>
+            <p:ph idx="1"/>
+          </p:nvPr>
+        </p:nvSpPr>
+        <p:spPr/>
+        <p:txBody>
+          <a:bodyPr/>
+          <a:lstStyle/>
+          <a:p>
+            <a:r>
+              <a:rPr lang="en-US" dirty="0">
+                <a:hlinkClick r:id="rId2"/>
+              </a:rPr>
+              <a:t>http://</a:t>
+            </a:r>
+            <a:r>
+              <a:rPr lang="en-US" dirty="0" smtClean="0">
+                <a:hlinkClick r:id="rId2"/>
+              </a:rPr>
+              <a:t>hub.darcs.net/ertes/articles/browse/media-processing.lhs</a:t>
+            </a:r>
+            <a:endParaRPr lang="en-US" dirty="0" smtClean="0"/>
+          </a:p>
+          <a:p>
+            <a:pPr lvl="1"/>
+            <a:r>
+              <a:rPr lang="en-US" dirty="0" smtClean="0"/>
+              <a:t>Media Processing </a:t>
+            </a:r>
+            <a:r>
+              <a:rPr lang="en-US" dirty="0"/>
+              <a:t>-- </a:t>
+            </a:r>
+            <a:r>
+              <a:rPr lang="en-US" dirty="0" err="1"/>
+              <a:t>Ertugrul</a:t>
+            </a:r>
+            <a:r>
+              <a:rPr lang="en-US" dirty="0"/>
+              <a:t> </a:t>
+            </a:r>
+            <a:r>
+              <a:rPr lang="en-US" dirty="0" err="1" smtClean="0"/>
+              <a:t>Söylemez</a:t>
+            </a:r>
+            <a:endParaRPr lang="en-US" dirty="0" smtClean="0"/>
+          </a:p>
+          <a:p>
+            <a:r>
+              <a:rPr lang="en-US" dirty="0">
+                <a:hlinkClick r:id="rId3"/>
+              </a:rPr>
+              <a:t>https://</a:t>
+            </a:r>
+            <a:r>
+              <a:rPr lang="en-US" dirty="0" smtClean="0">
+                <a:hlinkClick r:id="rId3"/>
+              </a:rPr>
+              <a:t>jaspervdj.be/posts/2014-11-27-comonads-image-processing.html</a:t>
+            </a:r>
+            <a:endParaRPr lang="en-US" dirty="0" smtClean="0"/>
+          </a:p>
+          <a:p>
+            <a:pPr lvl="1"/>
+            <a:r>
+              <a:rPr lang="en-US" dirty="0"/>
+              <a:t>Image Processing with Comonads -- Jasper Van der </a:t>
+            </a:r>
+            <a:r>
+              <a:rPr lang="en-US" dirty="0" err="1" smtClean="0"/>
+              <a:t>Jeugt</a:t>
+            </a:r>
+            <a:endParaRPr lang="en-US" dirty="0"/>
+          </a:p>
+          <a:p>
+            <a:endParaRPr lang="en-US" dirty="0"/>
+          </a:p>
+        </p:txBody>
+      </p:sp>
+    </p:spTree>
+    <p:extLst>
+      <p:ext uri="{BB962C8B-B14F-4D97-AF65-F5344CB8AC3E}">
+        <p14:creationId xmlns:p14="http://schemas.microsoft.com/office/powerpoint/2010/main" val="2127788774"/>
+      </p:ext>
+    </p:extLst>
+  </p:cSld>
+  <p:clrMapOvr>
+    <a:masterClrMapping/>
+  </p:clrMapOvr>
+  <p:transition spd="med">
+    <p:pull/>
+  </p:transition>
+  <p:timing>
+    <p:tnLst>
+      <p:par>
+        <p:cTn id="1" dur="indefinite" restart="never" nodeType="tmRoot"/>
+      </p:par>
+    </p:tnLst>
+  </p:timing>
+</p:sld>
+</file>
+
 <file path=ppt/slides/slide4.xml><?xml version="1.0" encoding="utf-8"?>
 <p:sld xmlns:a="http://schemas.openxmlformats.org/drawingml/2006/main" xmlns:r="http://schemas.openxmlformats.org/officeDocument/2006/relationships" xmlns:p="http://schemas.openxmlformats.org/presentationml/2006/main">
   <p:cSld>
@@ -27233,9 +27958,229 @@
   <p:timing>
     <p:tnLst>
       <p:par>
-        <p:cTn id="1" dur="indefinite" restart="never" nodeType="tmRoot"/>
+        <p:cTn id="1" dur="indefinite" restart="never" nodeType="tmRoot">
+          <p:childTnLst>
+            <p:seq concurrent="1" nextAc="seek">
+              <p:cTn id="2" dur="indefinite" nodeType="mainSeq">
+                <p:childTnLst>
+                  <p:par>
+                    <p:cTn id="3" fill="hold">
+                      <p:stCondLst>
+                        <p:cond delay="indefinite"/>
+                        <p:cond evt="onBegin" delay="0">
+                          <p:tn val="2"/>
+                        </p:cond>
+                      </p:stCondLst>
+                      <p:childTnLst>
+                        <p:par>
+                          <p:cTn id="4" fill="hold">
+                            <p:stCondLst>
+                              <p:cond delay="0"/>
+                            </p:stCondLst>
+                            <p:childTnLst>
+                              <p:par>
+                                <p:cTn id="5" presetID="1" presetClass="entr" presetSubtype="0" fill="hold" grpId="0" nodeType="withEffect">
+                                  <p:stCondLst>
+                                    <p:cond delay="0"/>
+                                  </p:stCondLst>
+                                  <p:childTnLst>
+                                    <p:set>
+                                      <p:cBhvr>
+                                        <p:cTn id="6" dur="1" fill="hold">
+                                          <p:stCondLst>
+                                            <p:cond delay="0"/>
+                                          </p:stCondLst>
+                                        </p:cTn>
+                                        <p:tgtEl>
+                                          <p:spTgt spid="3">
+                                            <p:txEl>
+                                              <p:pRg st="1" end="1"/>
+                                            </p:txEl>
+                                          </p:spTgt>
+                                        </p:tgtEl>
+                                        <p:attrNameLst>
+                                          <p:attrName>style.visibility</p:attrName>
+                                        </p:attrNameLst>
+                                      </p:cBhvr>
+                                      <p:to>
+                                        <p:strVal val="visible"/>
+                                      </p:to>
+                                    </p:set>
+                                  </p:childTnLst>
+                                </p:cTn>
+                              </p:par>
+                              <p:par>
+                                <p:cTn id="7" presetID="1" presetClass="entr" presetSubtype="0" fill="hold" grpId="0" nodeType="withEffect">
+                                  <p:stCondLst>
+                                    <p:cond delay="0"/>
+                                  </p:stCondLst>
+                                  <p:childTnLst>
+                                    <p:set>
+                                      <p:cBhvr>
+                                        <p:cTn id="8" dur="1" fill="hold">
+                                          <p:stCondLst>
+                                            <p:cond delay="0"/>
+                                          </p:stCondLst>
+                                        </p:cTn>
+                                        <p:tgtEl>
+                                          <p:spTgt spid="3">
+                                            <p:txEl>
+                                              <p:pRg st="2" end="2"/>
+                                            </p:txEl>
+                                          </p:spTgt>
+                                        </p:tgtEl>
+                                        <p:attrNameLst>
+                                          <p:attrName>style.visibility</p:attrName>
+                                        </p:attrNameLst>
+                                      </p:cBhvr>
+                                      <p:to>
+                                        <p:strVal val="visible"/>
+                                      </p:to>
+                                    </p:set>
+                                  </p:childTnLst>
+                                </p:cTn>
+                              </p:par>
+                              <p:par>
+                                <p:cTn id="9" presetID="1" presetClass="entr" presetSubtype="0" fill="hold" grpId="0" nodeType="withEffect">
+                                  <p:stCondLst>
+                                    <p:cond delay="0"/>
+                                  </p:stCondLst>
+                                  <p:childTnLst>
+                                    <p:set>
+                                      <p:cBhvr>
+                                        <p:cTn id="10" dur="1" fill="hold">
+                                          <p:stCondLst>
+                                            <p:cond delay="0"/>
+                                          </p:stCondLst>
+                                        </p:cTn>
+                                        <p:tgtEl>
+                                          <p:spTgt spid="3">
+                                            <p:txEl>
+                                              <p:pRg st="3" end="3"/>
+                                            </p:txEl>
+                                          </p:spTgt>
+                                        </p:tgtEl>
+                                        <p:attrNameLst>
+                                          <p:attrName>style.visibility</p:attrName>
+                                        </p:attrNameLst>
+                                      </p:cBhvr>
+                                      <p:to>
+                                        <p:strVal val="visible"/>
+                                      </p:to>
+                                    </p:set>
+                                  </p:childTnLst>
+                                </p:cTn>
+                              </p:par>
+                              <p:par>
+                                <p:cTn id="11" presetID="1" presetClass="entr" presetSubtype="0" fill="hold" grpId="0" nodeType="withEffect">
+                                  <p:stCondLst>
+                                    <p:cond delay="0"/>
+                                  </p:stCondLst>
+                                  <p:childTnLst>
+                                    <p:set>
+                                      <p:cBhvr>
+                                        <p:cTn id="12" dur="1" fill="hold">
+                                          <p:stCondLst>
+                                            <p:cond delay="0"/>
+                                          </p:stCondLst>
+                                        </p:cTn>
+                                        <p:tgtEl>
+                                          <p:spTgt spid="3">
+                                            <p:txEl>
+                                              <p:pRg st="4" end="4"/>
+                                            </p:txEl>
+                                          </p:spTgt>
+                                        </p:tgtEl>
+                                        <p:attrNameLst>
+                                          <p:attrName>style.visibility</p:attrName>
+                                        </p:attrNameLst>
+                                      </p:cBhvr>
+                                      <p:to>
+                                        <p:strVal val="visible"/>
+                                      </p:to>
+                                    </p:set>
+                                  </p:childTnLst>
+                                </p:cTn>
+                              </p:par>
+                            </p:childTnLst>
+                          </p:cTn>
+                        </p:par>
+                      </p:childTnLst>
+                    </p:cTn>
+                  </p:par>
+                  <p:par>
+                    <p:cTn id="13" fill="hold">
+                      <p:stCondLst>
+                        <p:cond delay="indefinite"/>
+                      </p:stCondLst>
+                      <p:childTnLst>
+                        <p:par>
+                          <p:cTn id="14" fill="hold">
+                            <p:stCondLst>
+                              <p:cond delay="0"/>
+                            </p:stCondLst>
+                            <p:childTnLst>
+                              <p:par>
+                                <p:cTn id="15" presetID="1" presetClass="entr" presetSubtype="0" fill="hold" grpId="0" nodeType="clickEffect">
+                                  <p:stCondLst>
+                                    <p:cond delay="0"/>
+                                  </p:stCondLst>
+                                  <p:childTnLst>
+                                    <p:set>
+                                      <p:cBhvr>
+                                        <p:cTn id="16" dur="1" fill="hold">
+                                          <p:stCondLst>
+                                            <p:cond delay="0"/>
+                                          </p:stCondLst>
+                                        </p:cTn>
+                                        <p:tgtEl>
+                                          <p:spTgt spid="3">
+                                            <p:txEl>
+                                              <p:pRg st="5" end="5"/>
+                                            </p:txEl>
+                                          </p:spTgt>
+                                        </p:tgtEl>
+                                        <p:attrNameLst>
+                                          <p:attrName>style.visibility</p:attrName>
+                                        </p:attrNameLst>
+                                      </p:cBhvr>
+                                      <p:to>
+                                        <p:strVal val="visible"/>
+                                      </p:to>
+                                    </p:set>
+                                  </p:childTnLst>
+                                </p:cTn>
+                              </p:par>
+                            </p:childTnLst>
+                          </p:cTn>
+                        </p:par>
+                      </p:childTnLst>
+                    </p:cTn>
+                  </p:par>
+                </p:childTnLst>
+              </p:cTn>
+              <p:prevCondLst>
+                <p:cond evt="onPrev" delay="0">
+                  <p:tgtEl>
+                    <p:sldTgt/>
+                  </p:tgtEl>
+                </p:cond>
+              </p:prevCondLst>
+              <p:nextCondLst>
+                <p:cond evt="onNext" delay="0">
+                  <p:tgtEl>
+                    <p:sldTgt/>
+                  </p:tgtEl>
+                </p:cond>
+              </p:nextCondLst>
+            </p:seq>
+          </p:childTnLst>
+        </p:cTn>
       </p:par>
     </p:tnLst>
+    <p:bldLst>
+      <p:bldP spid="3" grpId="0" uiExpand="1" build="p"/>
+    </p:bldLst>
   </p:timing>
 </p:sld>
 </file>
@@ -27548,7 +28493,7 @@
           <a:p>
             <a:r>
               <a:rPr lang="en-US" dirty="0" smtClean="0"/>
-              <a:t>Interactive Portion</a:t>
+              <a:t>What do you think!</a:t>
             </a:r>
             <a:endParaRPr lang="en-US" dirty="0"/>
           </a:p>
@@ -27583,8 +28528,17 @@
             </a:r>
             <a:r>
               <a:rPr lang="en-US" dirty="0" smtClean="0"/>
-              <a:t>? (Besides [])</a:t>
-            </a:r>
+              <a:t>? (Besides </a:t>
+            </a:r>
+            <a:r>
+              <a:rPr lang="en-US" dirty="0" smtClean="0"/>
+              <a:t>it being a list</a:t>
+            </a:r>
+            <a:r>
+              <a:rPr lang="en-US" dirty="0" smtClean="0"/>
+              <a:t>)</a:t>
+            </a:r>
+            <a:endParaRPr lang="en-US" dirty="0" smtClean="0"/>
           </a:p>
           <a:p>
             <a:r>
@@ -27614,8 +28568,17 @@
             <a:pPr lvl="2"/>
             <a:r>
               <a:rPr lang="en-US" dirty="0" smtClean="0"/>
-              <a:t>Border conditions?</a:t>
-            </a:r>
+              <a:t>How to handle </a:t>
+            </a:r>
+            <a:r>
+              <a:rPr lang="en-US" dirty="0" err="1" smtClean="0"/>
+              <a:t>bounadries</a:t>
+            </a:r>
+            <a:r>
+              <a:rPr lang="en-US" dirty="0" smtClean="0"/>
+              <a:t>?</a:t>
+            </a:r>
+            <a:endParaRPr lang="en-US" dirty="0" smtClean="0"/>
           </a:p>
           <a:p>
             <a:pPr lvl="2"/>
@@ -28844,7 +29807,7 @@
                                         <p:tgtEl>
                                           <p:spTgt spid="3">
                                             <p:txEl>
-                                              <p:pRg st="2" end="2"/>
+                                              <p:pRg st="0" end="0"/>
                                             </p:txEl>
                                           </p:spTgt>
                                         </p:tgtEl>
@@ -28875,7 +29838,7 @@
                                         <p:tgtEl>
                                           <p:spTgt spid="3">
                                             <p:txEl>
-                                              <p:pRg st="3" end="3"/>
+                                              <p:pRg st="1" end="1"/>
                                             </p:txEl>
                                           </p:spTgt>
                                         </p:tgtEl>
@@ -28924,7 +29887,7 @@
                                         <p:tgtEl>
                                           <p:spTgt spid="3">
                                             <p:txEl>
-                                              <p:pRg st="4" end="4"/>
+                                              <p:pRg st="2" end="2"/>
                                             </p:txEl>
                                           </p:spTgt>
                                         </p:tgtEl>
@@ -28955,7 +29918,7 @@
                                         <p:tgtEl>
                                           <p:spTgt spid="3">
                                             <p:txEl>
-                                              <p:pRg st="5" end="5"/>
+                                              <p:pRg st="3" end="3"/>
                                             </p:txEl>
                                           </p:spTgt>
                                         </p:tgtEl>
@@ -28970,35 +29933,26 @@
                                   </p:childTnLst>
                                 </p:cTn>
                               </p:par>
+                            </p:childTnLst>
+                          </p:cTn>
+                        </p:par>
+                      </p:childTnLst>
+                    </p:cTn>
+                  </p:par>
+                  <p:par>
+                    <p:cTn id="15" fill="hold">
+                      <p:stCondLst>
+                        <p:cond delay="indefinite"/>
+                      </p:stCondLst>
+                      <p:childTnLst>
+                        <p:par>
+                          <p:cTn id="16" fill="hold">
+                            <p:stCondLst>
+                              <p:cond delay="0"/>
+                            </p:stCondLst>
+                            <p:childTnLst>
                               <p:par>
-                                <p:cTn id="15" presetID="1" presetClass="entr" presetSubtype="0" fill="hold" grpId="0" nodeType="withEffect">
-                                  <p:stCondLst>
-                                    <p:cond delay="0"/>
-                                  </p:stCondLst>
-                                  <p:childTnLst>
-                                    <p:set>
-                                      <p:cBhvr>
-                                        <p:cTn id="16" dur="1" fill="hold">
-                                          <p:stCondLst>
-                                            <p:cond delay="0"/>
-                                          </p:stCondLst>
-                                        </p:cTn>
-                                        <p:tgtEl>
-                                          <p:spTgt spid="4"/>
-                                        </p:tgtEl>
-                                        <p:attrNameLst>
-                                          <p:attrName>style.visibility</p:attrName>
-                                        </p:attrNameLst>
-                                      </p:cBhvr>
-                                      <p:to>
-                                        <p:strVal val="visible"/>
-                                      </p:to>
-                                    </p:set>
-                                  </p:childTnLst>
-                                </p:cTn>
-                              </p:par>
-                              <p:par>
-                                <p:cTn id="17" presetID="1" presetClass="entr" presetSubtype="0" fill="hold" nodeType="withEffect">
+                                <p:cTn id="17" presetID="1" presetClass="entr" presetSubtype="0" fill="hold" grpId="0" nodeType="clickEffect">
                                   <p:stCondLst>
                                     <p:cond delay="0"/>
                                   </p:stCondLst>
@@ -29011,7 +29965,11 @@
                                           </p:stCondLst>
                                         </p:cTn>
                                         <p:tgtEl>
-                                          <p:spTgt spid="6"/>
+                                          <p:spTgt spid="3">
+                                            <p:txEl>
+                                              <p:pRg st="4" end="4"/>
+                                            </p:txEl>
+                                          </p:spTgt>
                                         </p:tgtEl>
                                         <p:attrNameLst>
                                           <p:attrName>style.visibility</p:attrName>
@@ -29040,9 +29998,94 @@
                                         <p:tgtEl>
                                           <p:spTgt spid="3">
                                             <p:txEl>
+                                              <p:pRg st="5" end="5"/>
+                                            </p:txEl>
+                                          </p:spTgt>
+                                        </p:tgtEl>
+                                        <p:attrNameLst>
+                                          <p:attrName>style.visibility</p:attrName>
+                                        </p:attrNameLst>
+                                      </p:cBhvr>
+                                      <p:to>
+                                        <p:strVal val="visible"/>
+                                      </p:to>
+                                    </p:set>
+                                  </p:childTnLst>
+                                </p:cTn>
+                              </p:par>
+                              <p:par>
+                                <p:cTn id="21" presetID="1" presetClass="entr" presetSubtype="0" fill="hold" grpId="0" nodeType="withEffect">
+                                  <p:stCondLst>
+                                    <p:cond delay="0"/>
+                                  </p:stCondLst>
+                                  <p:childTnLst>
+                                    <p:set>
+                                      <p:cBhvr>
+                                        <p:cTn id="22" dur="1" fill="hold">
+                                          <p:stCondLst>
+                                            <p:cond delay="0"/>
+                                          </p:stCondLst>
+                                        </p:cTn>
+                                        <p:tgtEl>
+                                          <p:spTgt spid="3">
+                                            <p:txEl>
                                               <p:pRg st="6" end="6"/>
                                             </p:txEl>
                                           </p:spTgt>
+                                        </p:tgtEl>
+                                        <p:attrNameLst>
+                                          <p:attrName>style.visibility</p:attrName>
+                                        </p:attrNameLst>
+                                      </p:cBhvr>
+                                      <p:to>
+                                        <p:strVal val="visible"/>
+                                      </p:to>
+                                    </p:set>
+                                  </p:childTnLst>
+                                </p:cTn>
+                              </p:par>
+                              <p:par>
+                                <p:cTn id="23" presetID="1" presetClass="entr" presetSubtype="0" fill="hold" grpId="0" nodeType="withEffect">
+                                  <p:stCondLst>
+                                    <p:cond delay="0"/>
+                                  </p:stCondLst>
+                                  <p:childTnLst>
+                                    <p:set>
+                                      <p:cBhvr>
+                                        <p:cTn id="24" dur="1" fill="hold">
+                                          <p:stCondLst>
+                                            <p:cond delay="0"/>
+                                          </p:stCondLst>
+                                        </p:cTn>
+                                        <p:tgtEl>
+                                          <p:spTgt spid="4"/>
+                                        </p:tgtEl>
+                                        <p:attrNameLst>
+                                          <p:attrName>style.visibility</p:attrName>
+                                        </p:attrNameLst>
+                                      </p:cBhvr>
+                                      <p:to>
+                                        <p:strVal val="visible"/>
+                                      </p:to>
+                                    </p:set>
+                                  </p:childTnLst>
+                                </p:cTn>
+                              </p:par>
+                              <p:par>
+                                <p:cTn id="25" presetID="1" presetClass="entr" presetSubtype="0" fill="hold" nodeType="withEffect">
+                                  <p:stCondLst>
+                                    <p:cond delay="0"/>
+                                  </p:stCondLst>
+                                  <p:childTnLst>
+                                    <p:set>
+                                      <p:cBhvr>
+                                        <p:cTn id="26" dur="1" fill="hold">
+                                          <p:stCondLst>
+                                            <p:cond delay="0"/>
+                                          </p:stCondLst>
+                                        </p:cTn>
+                                        <p:tgtEl>
+                                          <p:spTgt spid="6"/>
                                         </p:tgtEl>
                                         <p:attrNameLst>
                                           <p:attrName>style.visibility</p:attrName>
@@ -29083,7 +30126,7 @@
       </p:par>
     </p:tnLst>
     <p:bldLst>
-      <p:bldP spid="3" grpId="0" uiExpand="1" build="p"/>
+      <p:bldP spid="3" grpId="0" build="p"/>
       <p:bldP spid="4" grpId="0" animBg="1"/>
     </p:bldLst>
   </p:timing>

</xml_diff>